<commit_message>
Ajout des fenêtre dans le PPT
</commit_message>
<xml_diff>
--- a/MoneyThoring.pptx
+++ b/MoneyThoring.pptx
@@ -9,10 +9,12 @@
     <p:sldId id="257" r:id="rId3"/>
     <p:sldId id="258" r:id="rId4"/>
     <p:sldId id="259" r:id="rId5"/>
-    <p:sldId id="260" r:id="rId6"/>
-    <p:sldId id="261" r:id="rId7"/>
-    <p:sldId id="262" r:id="rId8"/>
-    <p:sldId id="263" r:id="rId9"/>
+    <p:sldId id="264" r:id="rId6"/>
+    <p:sldId id="265" r:id="rId7"/>
+    <p:sldId id="260" r:id="rId8"/>
+    <p:sldId id="261" r:id="rId9"/>
+    <p:sldId id="262" r:id="rId10"/>
+    <p:sldId id="263" r:id="rId11"/>
   </p:sldIdLst>
   <p:sldSz cx="12192000" cy="6858000"/>
   <p:notesSz cx="6858000" cy="9144000"/>
@@ -111,11 +113,12 @@
       </a:defRPr>
     </a:lvl9pPr>
   </p:defaultTextStyle>
+  <p:extLst>
+    <p:ext uri="{EFAFB233-063F-42B5-8137-9DF3F51BA10A}">
+      <p15:sldGuideLst xmlns:p15="http://schemas.microsoft.com/office/powerpoint/2012/main"/>
+    </p:ext>
+  </p:extLst>
 </p:presentation>
-</file>
-
-<file path=ppt/revisionInfo.xml><?xml version="1.0" encoding="utf-8"?>
-<p1510:revInfo xmlns:a="http://schemas.openxmlformats.org/drawingml/2006/main" xmlns:r="http://schemas.openxmlformats.org/officeDocument/2006/relationships" xmlns:p1510="http://schemas.microsoft.com/office/powerpoint/2015/10/main"/>
 </file>
 
 <file path=ppt/slideLayouts/slideLayout1.xml><?xml version="1.0" encoding="utf-8"?>
@@ -3898,6 +3901,89 @@
 </p:sld>
 </file>
 
+<file path=ppt/slides/slide10.xml><?xml version="1.0" encoding="utf-8"?>
+<p:sld xmlns:a="http://schemas.openxmlformats.org/drawingml/2006/main" xmlns:r="http://schemas.openxmlformats.org/officeDocument/2006/relationships" xmlns:p="http://schemas.openxmlformats.org/presentationml/2006/main">
+  <p:cSld>
+    <p:spTree>
+      <p:nvGrpSpPr>
+        <p:cNvPr id="1" name=""/>
+        <p:cNvGrpSpPr/>
+        <p:nvPr/>
+      </p:nvGrpSpPr>
+      <p:grpSpPr>
+        <a:xfrm>
+          <a:off x="0" y="0"/>
+          <a:ext cx="0" cy="0"/>
+          <a:chOff x="0" y="0"/>
+          <a:chExt cx="0" cy="0"/>
+        </a:xfrm>
+      </p:grpSpPr>
+      <p:sp>
+        <p:nvSpPr>
+          <p:cNvPr id="2" name="Titre 1">
+            <a:extLst>
+              <a:ext uri="{FF2B5EF4-FFF2-40B4-BE49-F238E27FC236}">
+                <a16:creationId xmlns:a16="http://schemas.microsoft.com/office/drawing/2014/main" id="{2B428A96-B86C-4114-A986-B602366F3EB2}"/>
+              </a:ext>
+            </a:extLst>
+          </p:cNvPr>
+          <p:cNvSpPr>
+            <a:spLocks noGrp="1"/>
+          </p:cNvSpPr>
+          <p:nvPr>
+            <p:ph type="title"/>
+          </p:nvPr>
+        </p:nvSpPr>
+        <p:spPr/>
+        <p:txBody>
+          <a:bodyPr/>
+          <a:lstStyle/>
+          <a:p>
+            <a:r>
+              <a:rPr lang="fr-CH" dirty="0"/>
+              <a:t>Conclusion</a:t>
+            </a:r>
+          </a:p>
+        </p:txBody>
+      </p:sp>
+      <p:sp>
+        <p:nvSpPr>
+          <p:cNvPr id="3" name="Espace réservé du contenu 2">
+            <a:extLst>
+              <a:ext uri="{FF2B5EF4-FFF2-40B4-BE49-F238E27FC236}">
+                <a16:creationId xmlns:a16="http://schemas.microsoft.com/office/drawing/2014/main" id="{EBE887E1-ECBA-41FE-971D-C53FDBDE43B9}"/>
+              </a:ext>
+            </a:extLst>
+          </p:cNvPr>
+          <p:cNvSpPr>
+            <a:spLocks noGrp="1"/>
+          </p:cNvSpPr>
+          <p:nvPr>
+            <p:ph idx="1"/>
+          </p:nvPr>
+        </p:nvSpPr>
+        <p:spPr/>
+        <p:txBody>
+          <a:bodyPr/>
+          <a:lstStyle/>
+          <a:p>
+            <a:endParaRPr lang="fr-CH"/>
+          </a:p>
+        </p:txBody>
+      </p:sp>
+    </p:spTree>
+    <p:extLst>
+      <p:ext uri="{BB962C8B-B14F-4D97-AF65-F5344CB8AC3E}">
+        <p14:creationId xmlns:p14="http://schemas.microsoft.com/office/powerpoint/2010/main" val="298666185"/>
+      </p:ext>
+    </p:extLst>
+  </p:cSld>
+  <p:clrMapOvr>
+    <a:masterClrMapping/>
+  </p:clrMapOvr>
+</p:sld>
+</file>
+
 <file path=ppt/slides/slide2.xml><?xml version="1.0" encoding="utf-8"?>
 <p:sld xmlns:a="http://schemas.openxmlformats.org/drawingml/2006/main" xmlns:r="http://schemas.openxmlformats.org/officeDocument/2006/relationships" xmlns:p="http://schemas.openxmlformats.org/presentationml/2006/main">
   <p:cSld>
@@ -4249,40 +4335,104 @@
           <a:p>
             <a:r>
               <a:rPr lang="fr-CH" dirty="0"/>
-              <a:t>BLL</a:t>
-            </a:r>
-          </a:p>
-        </p:txBody>
-      </p:sp>
-      <p:sp>
-        <p:nvSpPr>
-          <p:cNvPr id="3" name="Espace réservé du contenu 2">
+              <a:t>GUI</a:t>
+            </a:r>
+          </a:p>
+        </p:txBody>
+      </p:sp>
+      <p:pic>
+        <p:nvPicPr>
+          <p:cNvPr id="9" name="Espace réservé du contenu 8" descr="Une image contenant capture d’écran&#10;&#10;Description générée avec un niveau de confiance très élevé">
             <a:extLst>
               <a:ext uri="{FF2B5EF4-FFF2-40B4-BE49-F238E27FC236}">
-                <a16:creationId xmlns:a16="http://schemas.microsoft.com/office/drawing/2014/main" id="{EBE887E1-ECBA-41FE-971D-C53FDBDE43B9}"/>
+                <a16:creationId xmlns:a16="http://schemas.microsoft.com/office/drawing/2014/main" id="{724AC25F-361E-4493-B439-3820C45E25EF}"/>
               </a:ext>
             </a:extLst>
           </p:cNvPr>
-          <p:cNvSpPr>
-            <a:spLocks noGrp="1"/>
-          </p:cNvSpPr>
+          <p:cNvPicPr>
+            <a:picLocks noGrp="1" noChangeAspect="1"/>
+          </p:cNvPicPr>
           <p:nvPr>
             <p:ph idx="1"/>
           </p:nvPr>
-        </p:nvSpPr>
-        <p:spPr/>
-        <p:txBody>
-          <a:bodyPr/>
-          <a:lstStyle/>
-          <a:p>
-            <a:endParaRPr lang="fr-CH"/>
-          </a:p>
-        </p:txBody>
-      </p:sp>
+        </p:nvPicPr>
+        <p:blipFill>
+          <a:blip r:embed="rId2"/>
+          <a:stretch>
+            <a:fillRect/>
+          </a:stretch>
+        </p:blipFill>
+        <p:spPr>
+          <a:xfrm>
+            <a:off x="581192" y="2491910"/>
+            <a:ext cx="3670189" cy="2431782"/>
+          </a:xfrm>
+        </p:spPr>
+      </p:pic>
+      <p:pic>
+        <p:nvPicPr>
+          <p:cNvPr id="11" name="Image 10" descr="Une image contenant capture d’écran&#10;&#10;Description générée avec un niveau de confiance très élevé">
+            <a:extLst>
+              <a:ext uri="{FF2B5EF4-FFF2-40B4-BE49-F238E27FC236}">
+                <a16:creationId xmlns:a16="http://schemas.microsoft.com/office/drawing/2014/main" id="{594152FB-946E-4EE8-8617-6150F70E2C56}"/>
+              </a:ext>
+            </a:extLst>
+          </p:cNvPr>
+          <p:cNvPicPr>
+            <a:picLocks noChangeAspect="1"/>
+          </p:cNvPicPr>
+          <p:nvPr/>
+        </p:nvPicPr>
+        <p:blipFill>
+          <a:blip r:embed="rId3"/>
+          <a:stretch>
+            <a:fillRect/>
+          </a:stretch>
+        </p:blipFill>
+        <p:spPr>
+          <a:xfrm>
+            <a:off x="4260904" y="2491910"/>
+            <a:ext cx="3670191" cy="2431782"/>
+          </a:xfrm>
+          <a:prstGeom prst="rect">
+            <a:avLst/>
+          </a:prstGeom>
+        </p:spPr>
+      </p:pic>
+      <p:pic>
+        <p:nvPicPr>
+          <p:cNvPr id="13" name="Image 12" descr="Une image contenant capture d’écran&#10;&#10;Description générée avec un niveau de confiance très élevé">
+            <a:extLst>
+              <a:ext uri="{FF2B5EF4-FFF2-40B4-BE49-F238E27FC236}">
+                <a16:creationId xmlns:a16="http://schemas.microsoft.com/office/drawing/2014/main" id="{DA627EDF-5D16-4621-AEC2-A6AAABD3874C}"/>
+              </a:ext>
+            </a:extLst>
+          </p:cNvPr>
+          <p:cNvPicPr>
+            <a:picLocks noChangeAspect="1"/>
+          </p:cNvPicPr>
+          <p:nvPr/>
+        </p:nvPicPr>
+        <p:blipFill>
+          <a:blip r:embed="rId4"/>
+          <a:stretch>
+            <a:fillRect/>
+          </a:stretch>
+        </p:blipFill>
+        <p:spPr>
+          <a:xfrm>
+            <a:off x="7998370" y="2491910"/>
+            <a:ext cx="3670189" cy="2431782"/>
+          </a:xfrm>
+          <a:prstGeom prst="rect">
+            <a:avLst/>
+          </a:prstGeom>
+        </p:spPr>
+      </p:pic>
     </p:spTree>
     <p:extLst>
       <p:ext uri="{BB962C8B-B14F-4D97-AF65-F5344CB8AC3E}">
-        <p14:creationId xmlns:p14="http://schemas.microsoft.com/office/powerpoint/2010/main" val="910460189"/>
+        <p14:creationId xmlns:p14="http://schemas.microsoft.com/office/powerpoint/2010/main" val="1505250019"/>
       </p:ext>
     </p:extLst>
   </p:cSld>
@@ -4314,7 +4464,7 @@
           <p:cNvPr id="2" name="Titre 1">
             <a:extLst>
               <a:ext uri="{FF2B5EF4-FFF2-40B4-BE49-F238E27FC236}">
-                <a16:creationId xmlns:a16="http://schemas.microsoft.com/office/drawing/2014/main" id="{2B428A96-B86C-4114-A986-B602366F3EB2}"/>
+                <a16:creationId xmlns:a16="http://schemas.microsoft.com/office/drawing/2014/main" id="{1A3C95C0-4A3E-4099-886C-D17134B9F894}"/>
               </a:ext>
             </a:extLst>
           </p:cNvPr>
@@ -4332,40 +4482,74 @@
           <a:p>
             <a:r>
               <a:rPr lang="fr-CH" dirty="0"/>
-              <a:t>DAL</a:t>
-            </a:r>
-          </a:p>
-        </p:txBody>
-      </p:sp>
-      <p:sp>
-        <p:nvSpPr>
-          <p:cNvPr id="3" name="Espace réservé du contenu 2">
+              <a:t>GUI</a:t>
+            </a:r>
+          </a:p>
+        </p:txBody>
+      </p:sp>
+      <p:pic>
+        <p:nvPicPr>
+          <p:cNvPr id="5" name="Espace réservé du contenu 4" descr="Une image contenant capture d’écran&#10;&#10;Description générée avec un niveau de confiance très élevé">
             <a:extLst>
               <a:ext uri="{FF2B5EF4-FFF2-40B4-BE49-F238E27FC236}">
-                <a16:creationId xmlns:a16="http://schemas.microsoft.com/office/drawing/2014/main" id="{EBE887E1-ECBA-41FE-971D-C53FDBDE43B9}"/>
+                <a16:creationId xmlns:a16="http://schemas.microsoft.com/office/drawing/2014/main" id="{3F92266F-D24B-4947-A420-B88959CCF952}"/>
               </a:ext>
             </a:extLst>
           </p:cNvPr>
-          <p:cNvSpPr>
-            <a:spLocks noGrp="1"/>
-          </p:cNvSpPr>
+          <p:cNvPicPr>
+            <a:picLocks noGrp="1" noChangeAspect="1"/>
+          </p:cNvPicPr>
           <p:nvPr>
             <p:ph idx="1"/>
           </p:nvPr>
-        </p:nvSpPr>
-        <p:spPr/>
-        <p:txBody>
-          <a:bodyPr/>
-          <a:lstStyle/>
-          <a:p>
-            <a:endParaRPr lang="fr-CH"/>
-          </a:p>
-        </p:txBody>
-      </p:sp>
+        </p:nvPicPr>
+        <p:blipFill>
+          <a:blip r:embed="rId2"/>
+          <a:stretch>
+            <a:fillRect/>
+          </a:stretch>
+        </p:blipFill>
+        <p:spPr>
+          <a:xfrm>
+            <a:off x="581192" y="2269653"/>
+            <a:ext cx="4481034" cy="3170094"/>
+          </a:xfrm>
+        </p:spPr>
+      </p:pic>
+      <p:pic>
+        <p:nvPicPr>
+          <p:cNvPr id="7" name="Image 6" descr="Une image contenant capture d’écran&#10;&#10;Description générée avec un niveau de confiance très élevé">
+            <a:extLst>
+              <a:ext uri="{FF2B5EF4-FFF2-40B4-BE49-F238E27FC236}">
+                <a16:creationId xmlns:a16="http://schemas.microsoft.com/office/drawing/2014/main" id="{FA7A894C-B20E-4899-9A94-18A498AC5F8A}"/>
+              </a:ext>
+            </a:extLst>
+          </p:cNvPr>
+          <p:cNvPicPr>
+            <a:picLocks noChangeAspect="1"/>
+          </p:cNvPicPr>
+          <p:nvPr/>
+        </p:nvPicPr>
+        <p:blipFill>
+          <a:blip r:embed="rId3"/>
+          <a:stretch>
+            <a:fillRect/>
+          </a:stretch>
+        </p:blipFill>
+        <p:spPr>
+          <a:xfrm>
+            <a:off x="7029608" y="2268147"/>
+            <a:ext cx="4581200" cy="3171600"/>
+          </a:xfrm>
+          <a:prstGeom prst="rect">
+            <a:avLst/>
+          </a:prstGeom>
+        </p:spPr>
+      </p:pic>
     </p:spTree>
     <p:extLst>
       <p:ext uri="{BB962C8B-B14F-4D97-AF65-F5344CB8AC3E}">
-        <p14:creationId xmlns:p14="http://schemas.microsoft.com/office/powerpoint/2010/main" val="1257575831"/>
+        <p14:creationId xmlns:p14="http://schemas.microsoft.com/office/powerpoint/2010/main" val="620674425"/>
       </p:ext>
     </p:extLst>
   </p:cSld>
@@ -4415,7 +4599,7 @@
           <a:p>
             <a:r>
               <a:rPr lang="fr-CH" dirty="0"/>
-              <a:t>DB</a:t>
+              <a:t>BLL</a:t>
             </a:r>
           </a:p>
         </p:txBody>
@@ -4448,7 +4632,7 @@
     </p:spTree>
     <p:extLst>
       <p:ext uri="{BB962C8B-B14F-4D97-AF65-F5344CB8AC3E}">
-        <p14:creationId xmlns:p14="http://schemas.microsoft.com/office/powerpoint/2010/main" val="2168988302"/>
+        <p14:creationId xmlns:p14="http://schemas.microsoft.com/office/powerpoint/2010/main" val="910460189"/>
       </p:ext>
     </p:extLst>
   </p:cSld>
@@ -4498,7 +4682,7 @@
           <a:p>
             <a:r>
               <a:rPr lang="fr-CH" dirty="0"/>
-              <a:t>Conclusion</a:t>
+              <a:t>DAL</a:t>
             </a:r>
           </a:p>
         </p:txBody>
@@ -4531,7 +4715,90 @@
     </p:spTree>
     <p:extLst>
       <p:ext uri="{BB962C8B-B14F-4D97-AF65-F5344CB8AC3E}">
-        <p14:creationId xmlns:p14="http://schemas.microsoft.com/office/powerpoint/2010/main" val="298666185"/>
+        <p14:creationId xmlns:p14="http://schemas.microsoft.com/office/powerpoint/2010/main" val="1257575831"/>
+      </p:ext>
+    </p:extLst>
+  </p:cSld>
+  <p:clrMapOvr>
+    <a:masterClrMapping/>
+  </p:clrMapOvr>
+</p:sld>
+</file>
+
+<file path=ppt/slides/slide9.xml><?xml version="1.0" encoding="utf-8"?>
+<p:sld xmlns:a="http://schemas.openxmlformats.org/drawingml/2006/main" xmlns:r="http://schemas.openxmlformats.org/officeDocument/2006/relationships" xmlns:p="http://schemas.openxmlformats.org/presentationml/2006/main">
+  <p:cSld>
+    <p:spTree>
+      <p:nvGrpSpPr>
+        <p:cNvPr id="1" name=""/>
+        <p:cNvGrpSpPr/>
+        <p:nvPr/>
+      </p:nvGrpSpPr>
+      <p:grpSpPr>
+        <a:xfrm>
+          <a:off x="0" y="0"/>
+          <a:ext cx="0" cy="0"/>
+          <a:chOff x="0" y="0"/>
+          <a:chExt cx="0" cy="0"/>
+        </a:xfrm>
+      </p:grpSpPr>
+      <p:sp>
+        <p:nvSpPr>
+          <p:cNvPr id="2" name="Titre 1">
+            <a:extLst>
+              <a:ext uri="{FF2B5EF4-FFF2-40B4-BE49-F238E27FC236}">
+                <a16:creationId xmlns:a16="http://schemas.microsoft.com/office/drawing/2014/main" id="{2B428A96-B86C-4114-A986-B602366F3EB2}"/>
+              </a:ext>
+            </a:extLst>
+          </p:cNvPr>
+          <p:cNvSpPr>
+            <a:spLocks noGrp="1"/>
+          </p:cNvSpPr>
+          <p:nvPr>
+            <p:ph type="title"/>
+          </p:nvPr>
+        </p:nvSpPr>
+        <p:spPr/>
+        <p:txBody>
+          <a:bodyPr/>
+          <a:lstStyle/>
+          <a:p>
+            <a:r>
+              <a:rPr lang="fr-CH" dirty="0"/>
+              <a:t>DB</a:t>
+            </a:r>
+          </a:p>
+        </p:txBody>
+      </p:sp>
+      <p:sp>
+        <p:nvSpPr>
+          <p:cNvPr id="3" name="Espace réservé du contenu 2">
+            <a:extLst>
+              <a:ext uri="{FF2B5EF4-FFF2-40B4-BE49-F238E27FC236}">
+                <a16:creationId xmlns:a16="http://schemas.microsoft.com/office/drawing/2014/main" id="{EBE887E1-ECBA-41FE-971D-C53FDBDE43B9}"/>
+              </a:ext>
+            </a:extLst>
+          </p:cNvPr>
+          <p:cNvSpPr>
+            <a:spLocks noGrp="1"/>
+          </p:cNvSpPr>
+          <p:nvPr>
+            <p:ph idx="1"/>
+          </p:nvPr>
+        </p:nvSpPr>
+        <p:spPr/>
+        <p:txBody>
+          <a:bodyPr/>
+          <a:lstStyle/>
+          <a:p>
+            <a:endParaRPr lang="fr-CH"/>
+          </a:p>
+        </p:txBody>
+      </p:sp>
+    </p:spTree>
+    <p:extLst>
+      <p:ext uri="{BB962C8B-B14F-4D97-AF65-F5344CB8AC3E}">
+        <p14:creationId xmlns:p14="http://schemas.microsoft.com/office/powerpoint/2010/main" val="2168988302"/>
       </p:ext>
     </p:extLst>
   </p:cSld>

</xml_diff>

<commit_message>
Modification du powerpoint et ajout du Gant
</commit_message>
<xml_diff>
--- a/MoneyThoring.pptx
+++ b/MoneyThoring.pptx
@@ -10,11 +10,12 @@
     <p:sldId id="258" r:id="rId4"/>
     <p:sldId id="259" r:id="rId5"/>
     <p:sldId id="264" r:id="rId6"/>
-    <p:sldId id="265" r:id="rId7"/>
-    <p:sldId id="260" r:id="rId8"/>
-    <p:sldId id="261" r:id="rId9"/>
-    <p:sldId id="262" r:id="rId10"/>
-    <p:sldId id="263" r:id="rId11"/>
+    <p:sldId id="266" r:id="rId7"/>
+    <p:sldId id="265" r:id="rId8"/>
+    <p:sldId id="262" r:id="rId9"/>
+    <p:sldId id="261" r:id="rId10"/>
+    <p:sldId id="260" r:id="rId11"/>
+    <p:sldId id="263" r:id="rId12"/>
   </p:sldIdLst>
   <p:sldSz cx="12192000" cy="6858000"/>
   <p:notesSz cx="6858000" cy="9144000"/>
@@ -367,7 +368,7 @@
             <a:fld id="{B61BEF0D-F0BB-DE4B-95CE-6DB70DBA9567}" type="datetimeFigureOut">
               <a:rPr lang="en-US" dirty="0"/>
               <a:pPr/>
-              <a:t>4/15/2018</a:t>
+              <a:t>4/16/2018</a:t>
             </a:fld>
             <a:endParaRPr lang="en-US" dirty="0"/>
           </a:p>
@@ -626,7 +627,7 @@
             <a:fld id="{B61BEF0D-F0BB-DE4B-95CE-6DB70DBA9567}" type="datetimeFigureOut">
               <a:rPr lang="en-US" dirty="0"/>
               <a:pPr/>
-              <a:t>4/15/2018</a:t>
+              <a:t>4/16/2018</a:t>
             </a:fld>
             <a:endParaRPr lang="en-US" dirty="0"/>
           </a:p>
@@ -858,7 +859,7 @@
             <a:fld id="{B61BEF0D-F0BB-DE4B-95CE-6DB70DBA9567}" type="datetimeFigureOut">
               <a:rPr lang="en-US" dirty="0"/>
               <a:pPr/>
-              <a:t>4/15/2018</a:t>
+              <a:t>4/16/2018</a:t>
             </a:fld>
             <a:endParaRPr lang="en-US" dirty="0"/>
           </a:p>
@@ -1095,7 +1096,7 @@
             <a:fld id="{B61BEF0D-F0BB-DE4B-95CE-6DB70DBA9567}" type="datetimeFigureOut">
               <a:rPr lang="en-US" dirty="0"/>
               <a:pPr/>
-              <a:t>4/15/2018</a:t>
+              <a:t>4/16/2018</a:t>
             </a:fld>
             <a:endParaRPr lang="en-US" dirty="0"/>
           </a:p>
@@ -1399,7 +1400,7 @@
             <a:fld id="{B61BEF0D-F0BB-DE4B-95CE-6DB70DBA9567}" type="datetimeFigureOut">
               <a:rPr lang="en-US" dirty="0"/>
               <a:pPr/>
-              <a:t>4/15/2018</a:t>
+              <a:t>4/16/2018</a:t>
             </a:fld>
             <a:endParaRPr lang="en-US" dirty="0"/>
           </a:p>
@@ -1698,7 +1699,7 @@
             <a:fld id="{B61BEF0D-F0BB-DE4B-95CE-6DB70DBA9567}" type="datetimeFigureOut">
               <a:rPr lang="en-US" dirty="0"/>
               <a:pPr/>
-              <a:t>4/15/2018</a:t>
+              <a:t>4/16/2018</a:t>
             </a:fld>
             <a:endParaRPr lang="en-US" dirty="0"/>
           </a:p>
@@ -2117,7 +2118,7 @@
             <a:fld id="{B61BEF0D-F0BB-DE4B-95CE-6DB70DBA9567}" type="datetimeFigureOut">
               <a:rPr lang="en-US" dirty="0"/>
               <a:pPr/>
-              <a:t>4/15/2018</a:t>
+              <a:t>4/16/2018</a:t>
             </a:fld>
             <a:endParaRPr lang="en-US" dirty="0"/>
           </a:p>
@@ -2276,7 +2277,7 @@
             <a:fld id="{B61BEF0D-F0BB-DE4B-95CE-6DB70DBA9567}" type="datetimeFigureOut">
               <a:rPr lang="en-US" dirty="0"/>
               <a:pPr/>
-              <a:t>4/15/2018</a:t>
+              <a:t>4/16/2018</a:t>
             </a:fld>
             <a:endParaRPr lang="en-US" dirty="0"/>
           </a:p>
@@ -2368,7 +2369,7 @@
             <a:fld id="{B61BEF0D-F0BB-DE4B-95CE-6DB70DBA9567}" type="datetimeFigureOut">
               <a:rPr lang="en-US" dirty="0"/>
               <a:pPr/>
-              <a:t>4/15/2018</a:t>
+              <a:t>4/16/2018</a:t>
             </a:fld>
             <a:endParaRPr lang="en-US" dirty="0"/>
           </a:p>
@@ -2743,7 +2744,7 @@
             <a:fld id="{B61BEF0D-F0BB-DE4B-95CE-6DB70DBA9567}" type="datetimeFigureOut">
               <a:rPr lang="en-US" dirty="0"/>
               <a:pPr/>
-              <a:t>4/15/2018</a:t>
+              <a:t>4/16/2018</a:t>
             </a:fld>
             <a:endParaRPr lang="en-US" dirty="0"/>
           </a:p>
@@ -3029,7 +3030,7 @@
             <a:fld id="{B61BEF0D-F0BB-DE4B-95CE-6DB70DBA9567}" type="datetimeFigureOut">
               <a:rPr lang="en-US" dirty="0"/>
               <a:pPr/>
-              <a:t>4/15/2018</a:t>
+              <a:t>4/16/2018</a:t>
             </a:fld>
             <a:endParaRPr lang="en-US" dirty="0"/>
           </a:p>
@@ -3237,7 +3238,7 @@
             <a:fld id="{B61BEF0D-F0BB-DE4B-95CE-6DB70DBA9567}" type="datetimeFigureOut">
               <a:rPr lang="en-US" dirty="0"/>
               <a:pPr/>
-              <a:t>4/15/2018</a:t>
+              <a:t>4/16/2018</a:t>
             </a:fld>
             <a:endParaRPr lang="en-US" dirty="0"/>
           </a:p>
@@ -3941,6 +3942,89 @@
           <a:p>
             <a:r>
               <a:rPr lang="fr-CH" dirty="0"/>
+              <a:t>BLL</a:t>
+            </a:r>
+          </a:p>
+        </p:txBody>
+      </p:sp>
+      <p:sp>
+        <p:nvSpPr>
+          <p:cNvPr id="3" name="Espace réservé du contenu 2">
+            <a:extLst>
+              <a:ext uri="{FF2B5EF4-FFF2-40B4-BE49-F238E27FC236}">
+                <a16:creationId xmlns:a16="http://schemas.microsoft.com/office/drawing/2014/main" id="{EBE887E1-ECBA-41FE-971D-C53FDBDE43B9}"/>
+              </a:ext>
+            </a:extLst>
+          </p:cNvPr>
+          <p:cNvSpPr>
+            <a:spLocks noGrp="1"/>
+          </p:cNvSpPr>
+          <p:nvPr>
+            <p:ph idx="1"/>
+          </p:nvPr>
+        </p:nvSpPr>
+        <p:spPr/>
+        <p:txBody>
+          <a:bodyPr/>
+          <a:lstStyle/>
+          <a:p>
+            <a:endParaRPr lang="fr-CH"/>
+          </a:p>
+        </p:txBody>
+      </p:sp>
+    </p:spTree>
+    <p:extLst>
+      <p:ext uri="{BB962C8B-B14F-4D97-AF65-F5344CB8AC3E}">
+        <p14:creationId xmlns:p14="http://schemas.microsoft.com/office/powerpoint/2010/main" val="910460189"/>
+      </p:ext>
+    </p:extLst>
+  </p:cSld>
+  <p:clrMapOvr>
+    <a:masterClrMapping/>
+  </p:clrMapOvr>
+</p:sld>
+</file>
+
+<file path=ppt/slides/slide11.xml><?xml version="1.0" encoding="utf-8"?>
+<p:sld xmlns:a="http://schemas.openxmlformats.org/drawingml/2006/main" xmlns:r="http://schemas.openxmlformats.org/officeDocument/2006/relationships" xmlns:p="http://schemas.openxmlformats.org/presentationml/2006/main">
+  <p:cSld>
+    <p:spTree>
+      <p:nvGrpSpPr>
+        <p:cNvPr id="1" name=""/>
+        <p:cNvGrpSpPr/>
+        <p:nvPr/>
+      </p:nvGrpSpPr>
+      <p:grpSpPr>
+        <a:xfrm>
+          <a:off x="0" y="0"/>
+          <a:ext cx="0" cy="0"/>
+          <a:chOff x="0" y="0"/>
+          <a:chExt cx="0" cy="0"/>
+        </a:xfrm>
+      </p:grpSpPr>
+      <p:sp>
+        <p:nvSpPr>
+          <p:cNvPr id="2" name="Titre 1">
+            <a:extLst>
+              <a:ext uri="{FF2B5EF4-FFF2-40B4-BE49-F238E27FC236}">
+                <a16:creationId xmlns:a16="http://schemas.microsoft.com/office/drawing/2014/main" id="{2B428A96-B86C-4114-A986-B602366F3EB2}"/>
+              </a:ext>
+            </a:extLst>
+          </p:cNvPr>
+          <p:cNvSpPr>
+            <a:spLocks noGrp="1"/>
+          </p:cNvSpPr>
+          <p:nvPr>
+            <p:ph type="title"/>
+          </p:nvPr>
+        </p:nvSpPr>
+        <p:spPr/>
+        <p:txBody>
+          <a:bodyPr/>
+          <a:lstStyle/>
+          <a:p>
+            <a:r>
+              <a:rPr lang="fr-CH" dirty="0"/>
               <a:t>Conclusion</a:t>
             </a:r>
           </a:p>
@@ -4064,7 +4148,7 @@
           <a:p>
             <a:r>
               <a:rPr lang="fr-CH" dirty="0"/>
-              <a:t>BLL</a:t>
+              <a:t>DB</a:t>
             </a:r>
           </a:p>
           <a:p>
@@ -4076,7 +4160,7 @@
           <a:p>
             <a:r>
               <a:rPr lang="fr-CH" dirty="0"/>
-              <a:t>DB</a:t>
+              <a:t>BLL</a:t>
             </a:r>
           </a:p>
         </p:txBody>
@@ -4264,7 +4348,7 @@
           <a:p>
             <a:r>
               <a:rPr lang="fr-CH" dirty="0"/>
-              <a:t>Difficulté technique rencontrées </a:t>
+              <a:t>Difficultés techniques rencontrées </a:t>
             </a:r>
           </a:p>
           <a:p>
@@ -4364,69 +4448,9 @@
         </p:blipFill>
         <p:spPr>
           <a:xfrm>
-            <a:off x="581192" y="2491910"/>
-            <a:ext cx="3670189" cy="2431782"/>
-          </a:xfrm>
-        </p:spPr>
-      </p:pic>
-      <p:pic>
-        <p:nvPicPr>
-          <p:cNvPr id="11" name="Image 10" descr="Une image contenant capture d’écran&#10;&#10;Description générée avec un niveau de confiance très élevé">
-            <a:extLst>
-              <a:ext uri="{FF2B5EF4-FFF2-40B4-BE49-F238E27FC236}">
-                <a16:creationId xmlns:a16="http://schemas.microsoft.com/office/drawing/2014/main" id="{594152FB-946E-4EE8-8617-6150F70E2C56}"/>
-              </a:ext>
-            </a:extLst>
-          </p:cNvPr>
-          <p:cNvPicPr>
-            <a:picLocks noChangeAspect="1"/>
-          </p:cNvPicPr>
-          <p:nvPr/>
-        </p:nvPicPr>
-        <p:blipFill>
-          <a:blip r:embed="rId3"/>
-          <a:stretch>
-            <a:fillRect/>
-          </a:stretch>
-        </p:blipFill>
-        <p:spPr>
-          <a:xfrm>
-            <a:off x="4260904" y="2491910"/>
-            <a:ext cx="3670191" cy="2431782"/>
-          </a:xfrm>
-          <a:prstGeom prst="rect">
-            <a:avLst/>
-          </a:prstGeom>
-        </p:spPr>
-      </p:pic>
-      <p:pic>
-        <p:nvPicPr>
-          <p:cNvPr id="13" name="Image 12" descr="Une image contenant capture d’écran&#10;&#10;Description générée avec un niveau de confiance très élevé">
-            <a:extLst>
-              <a:ext uri="{FF2B5EF4-FFF2-40B4-BE49-F238E27FC236}">
-                <a16:creationId xmlns:a16="http://schemas.microsoft.com/office/drawing/2014/main" id="{DA627EDF-5D16-4621-AEC2-A6AAABD3874C}"/>
-              </a:ext>
-            </a:extLst>
-          </p:cNvPr>
-          <p:cNvPicPr>
-            <a:picLocks noChangeAspect="1"/>
-          </p:cNvPicPr>
-          <p:nvPr/>
-        </p:nvPicPr>
-        <p:blipFill>
-          <a:blip r:embed="rId4"/>
-          <a:stretch>
-            <a:fillRect/>
-          </a:stretch>
-        </p:blipFill>
-        <p:spPr>
-          <a:xfrm>
-            <a:off x="7998370" y="2491910"/>
-            <a:ext cx="3670189" cy="2431782"/>
-          </a:xfrm>
-          <a:prstGeom prst="rect">
-            <a:avLst/>
-          </a:prstGeom>
+            <a:off x="3118121" y="2209698"/>
+            <a:ext cx="5955757" cy="3946146"/>
+          </a:xfrm>
         </p:spPr>
       </p:pic>
     </p:spTree>
@@ -4464,7 +4488,7 @@
           <p:cNvPr id="2" name="Titre 1">
             <a:extLst>
               <a:ext uri="{FF2B5EF4-FFF2-40B4-BE49-F238E27FC236}">
-                <a16:creationId xmlns:a16="http://schemas.microsoft.com/office/drawing/2014/main" id="{1A3C95C0-4A3E-4099-886C-D17134B9F894}"/>
+                <a16:creationId xmlns:a16="http://schemas.microsoft.com/office/drawing/2014/main" id="{2B428A96-B86C-4114-A986-B602366F3EB2}"/>
               </a:ext>
             </a:extLst>
           </p:cNvPr>
@@ -4489,19 +4513,17 @@
       </p:sp>
       <p:pic>
         <p:nvPicPr>
-          <p:cNvPr id="5" name="Espace réservé du contenu 4" descr="Une image contenant capture d’écran&#10;&#10;Description générée avec un niveau de confiance très élevé">
+          <p:cNvPr id="11" name="Image 10" descr="Une image contenant capture d’écran&#10;&#10;Description générée avec un niveau de confiance très élevé">
             <a:extLst>
               <a:ext uri="{FF2B5EF4-FFF2-40B4-BE49-F238E27FC236}">
-                <a16:creationId xmlns:a16="http://schemas.microsoft.com/office/drawing/2014/main" id="{3F92266F-D24B-4947-A420-B88959CCF952}"/>
+                <a16:creationId xmlns:a16="http://schemas.microsoft.com/office/drawing/2014/main" id="{594152FB-946E-4EE8-8617-6150F70E2C56}"/>
               </a:ext>
             </a:extLst>
           </p:cNvPr>
           <p:cNvPicPr>
-            <a:picLocks noGrp="1" noChangeAspect="1"/>
+            <a:picLocks noChangeAspect="1"/>
           </p:cNvPicPr>
-          <p:nvPr>
-            <p:ph idx="1"/>
-          </p:nvPr>
+          <p:nvPr/>
         </p:nvPicPr>
         <p:blipFill>
           <a:blip r:embed="rId2"/>
@@ -4511,17 +4533,20 @@
         </p:blipFill>
         <p:spPr>
           <a:xfrm>
-            <a:off x="581192" y="2269653"/>
-            <a:ext cx="4481034" cy="3170094"/>
-          </a:xfrm>
+            <a:off x="581191" y="2236935"/>
+            <a:ext cx="5364000" cy="3554060"/>
+          </a:xfrm>
+          <a:prstGeom prst="rect">
+            <a:avLst/>
+          </a:prstGeom>
         </p:spPr>
       </p:pic>
       <p:pic>
         <p:nvPicPr>
-          <p:cNvPr id="7" name="Image 6" descr="Une image contenant capture d’écran&#10;&#10;Description générée avec un niveau de confiance très élevé">
+          <p:cNvPr id="13" name="Image 12" descr="Une image contenant capture d’écran&#10;&#10;Description générée avec un niveau de confiance très élevé">
             <a:extLst>
               <a:ext uri="{FF2B5EF4-FFF2-40B4-BE49-F238E27FC236}">
-                <a16:creationId xmlns:a16="http://schemas.microsoft.com/office/drawing/2014/main" id="{FA7A894C-B20E-4899-9A94-18A498AC5F8A}"/>
+                <a16:creationId xmlns:a16="http://schemas.microsoft.com/office/drawing/2014/main" id="{DA627EDF-5D16-4621-AEC2-A6AAABD3874C}"/>
               </a:ext>
             </a:extLst>
           </p:cNvPr>
@@ -4538,8 +4563,8 @@
         </p:blipFill>
         <p:spPr>
           <a:xfrm>
-            <a:off x="7029608" y="2268147"/>
-            <a:ext cx="4581200" cy="3171600"/>
+            <a:off x="6246810" y="2236933"/>
+            <a:ext cx="5364000" cy="3554062"/>
           </a:xfrm>
           <a:prstGeom prst="rect">
             <a:avLst/>
@@ -4549,7 +4574,7 @@
     </p:spTree>
     <p:extLst>
       <p:ext uri="{BB962C8B-B14F-4D97-AF65-F5344CB8AC3E}">
-        <p14:creationId xmlns:p14="http://schemas.microsoft.com/office/powerpoint/2010/main" val="620674425"/>
+        <p14:creationId xmlns:p14="http://schemas.microsoft.com/office/powerpoint/2010/main" val="929550165"/>
       </p:ext>
     </p:extLst>
   </p:cSld>
@@ -4581,7 +4606,7 @@
           <p:cNvPr id="2" name="Titre 1">
             <a:extLst>
               <a:ext uri="{FF2B5EF4-FFF2-40B4-BE49-F238E27FC236}">
-                <a16:creationId xmlns:a16="http://schemas.microsoft.com/office/drawing/2014/main" id="{2B428A96-B86C-4114-A986-B602366F3EB2}"/>
+                <a16:creationId xmlns:a16="http://schemas.microsoft.com/office/drawing/2014/main" id="{1A3C95C0-4A3E-4099-886C-D17134B9F894}"/>
               </a:ext>
             </a:extLst>
           </p:cNvPr>
@@ -4599,40 +4624,74 @@
           <a:p>
             <a:r>
               <a:rPr lang="fr-CH" dirty="0"/>
-              <a:t>BLL</a:t>
-            </a:r>
-          </a:p>
-        </p:txBody>
-      </p:sp>
-      <p:sp>
-        <p:nvSpPr>
-          <p:cNvPr id="3" name="Espace réservé du contenu 2">
+              <a:t>GUI</a:t>
+            </a:r>
+          </a:p>
+        </p:txBody>
+      </p:sp>
+      <p:pic>
+        <p:nvPicPr>
+          <p:cNvPr id="5" name="Espace réservé du contenu 4" descr="Une image contenant capture d’écran&#10;&#10;Description générée avec un niveau de confiance très élevé">
             <a:extLst>
               <a:ext uri="{FF2B5EF4-FFF2-40B4-BE49-F238E27FC236}">
-                <a16:creationId xmlns:a16="http://schemas.microsoft.com/office/drawing/2014/main" id="{EBE887E1-ECBA-41FE-971D-C53FDBDE43B9}"/>
+                <a16:creationId xmlns:a16="http://schemas.microsoft.com/office/drawing/2014/main" id="{3F92266F-D24B-4947-A420-B88959CCF952}"/>
               </a:ext>
             </a:extLst>
           </p:cNvPr>
-          <p:cNvSpPr>
-            <a:spLocks noGrp="1"/>
-          </p:cNvSpPr>
+          <p:cNvPicPr>
+            <a:picLocks noGrp="1" noChangeAspect="1"/>
+          </p:cNvPicPr>
           <p:nvPr>
             <p:ph idx="1"/>
           </p:nvPr>
-        </p:nvSpPr>
-        <p:spPr/>
-        <p:txBody>
-          <a:bodyPr/>
-          <a:lstStyle/>
-          <a:p>
-            <a:endParaRPr lang="fr-CH"/>
-          </a:p>
-        </p:txBody>
-      </p:sp>
+        </p:nvPicPr>
+        <p:blipFill>
+          <a:blip r:embed="rId2"/>
+          <a:stretch>
+            <a:fillRect/>
+          </a:stretch>
+        </p:blipFill>
+        <p:spPr>
+          <a:xfrm>
+            <a:off x="581192" y="2269652"/>
+            <a:ext cx="5362408" cy="3793619"/>
+          </a:xfrm>
+        </p:spPr>
+      </p:pic>
+      <p:pic>
+        <p:nvPicPr>
+          <p:cNvPr id="7" name="Image 6" descr="Une image contenant capture d’écran&#10;&#10;Description générée avec un niveau de confiance très élevé">
+            <a:extLst>
+              <a:ext uri="{FF2B5EF4-FFF2-40B4-BE49-F238E27FC236}">
+                <a16:creationId xmlns:a16="http://schemas.microsoft.com/office/drawing/2014/main" id="{FA7A894C-B20E-4899-9A94-18A498AC5F8A}"/>
+              </a:ext>
+            </a:extLst>
+          </p:cNvPr>
+          <p:cNvPicPr>
+            <a:picLocks noChangeAspect="1"/>
+          </p:cNvPicPr>
+          <p:nvPr/>
+        </p:nvPicPr>
+        <p:blipFill>
+          <a:blip r:embed="rId3"/>
+          <a:stretch>
+            <a:fillRect/>
+          </a:stretch>
+        </p:blipFill>
+        <p:spPr>
+          <a:xfrm>
+            <a:off x="6096000" y="2268147"/>
+            <a:ext cx="5514808" cy="3817944"/>
+          </a:xfrm>
+          <a:prstGeom prst="rect">
+            <a:avLst/>
+          </a:prstGeom>
+        </p:spPr>
+      </p:pic>
     </p:spTree>
     <p:extLst>
       <p:ext uri="{BB962C8B-B14F-4D97-AF65-F5344CB8AC3E}">
-        <p14:creationId xmlns:p14="http://schemas.microsoft.com/office/powerpoint/2010/main" val="910460189"/>
+        <p14:creationId xmlns:p14="http://schemas.microsoft.com/office/powerpoint/2010/main" val="620674425"/>
       </p:ext>
     </p:extLst>
   </p:cSld>
@@ -4682,40 +4741,327 @@
           <a:p>
             <a:r>
               <a:rPr lang="fr-CH" dirty="0"/>
-              <a:t>DAL</a:t>
-            </a:r>
-          </a:p>
-        </p:txBody>
-      </p:sp>
-      <p:sp>
-        <p:nvSpPr>
-          <p:cNvPr id="3" name="Espace réservé du contenu 2">
+              <a:t>DB</a:t>
+            </a:r>
+          </a:p>
+        </p:txBody>
+      </p:sp>
+      <p:pic>
+        <p:nvPicPr>
+          <p:cNvPr id="5" name="Image 4">
             <a:extLst>
               <a:ext uri="{FF2B5EF4-FFF2-40B4-BE49-F238E27FC236}">
-                <a16:creationId xmlns:a16="http://schemas.microsoft.com/office/drawing/2014/main" id="{EBE887E1-ECBA-41FE-971D-C53FDBDE43B9}"/>
+                <a16:creationId xmlns:a16="http://schemas.microsoft.com/office/drawing/2014/main" id="{BA6BFC20-32D7-4139-B07F-D89E67427016}"/>
               </a:ext>
             </a:extLst>
           </p:cNvPr>
-          <p:cNvSpPr>
-            <a:spLocks noGrp="1"/>
-          </p:cNvSpPr>
-          <p:nvPr>
-            <p:ph idx="1"/>
-          </p:nvPr>
-        </p:nvSpPr>
-        <p:spPr/>
-        <p:txBody>
-          <a:bodyPr/>
-          <a:lstStyle/>
-          <a:p>
-            <a:endParaRPr lang="fr-CH"/>
-          </a:p>
-        </p:txBody>
-      </p:sp>
+          <p:cNvPicPr>
+            <a:picLocks noChangeAspect="1"/>
+          </p:cNvPicPr>
+          <p:nvPr/>
+        </p:nvPicPr>
+        <p:blipFill>
+          <a:blip r:embed="rId2"/>
+          <a:stretch>
+            <a:fillRect/>
+          </a:stretch>
+        </p:blipFill>
+        <p:spPr>
+          <a:xfrm>
+            <a:off x="1974110" y="576960"/>
+            <a:ext cx="8084293" cy="5967843"/>
+          </a:xfrm>
+          <a:prstGeom prst="rect">
+            <a:avLst/>
+          </a:prstGeom>
+        </p:spPr>
+      </p:pic>
+      <p:sp>
+        <p:nvSpPr>
+          <p:cNvPr id="6" name="ZoneTexte 5">
+            <a:extLst>
+              <a:ext uri="{FF2B5EF4-FFF2-40B4-BE49-F238E27FC236}">
+                <a16:creationId xmlns:a16="http://schemas.microsoft.com/office/drawing/2014/main" id="{7D5CFD9E-5791-4ACD-A7D1-750014253447}"/>
+              </a:ext>
+            </a:extLst>
+          </p:cNvPr>
+          <p:cNvSpPr txBox="1"/>
+          <p:nvPr/>
+        </p:nvSpPr>
+        <p:spPr>
+          <a:xfrm>
+            <a:off x="7954578" y="2729481"/>
+            <a:ext cx="2263312" cy="369332"/>
+          </a:xfrm>
+          <a:prstGeom prst="rect">
+            <a:avLst/>
+          </a:prstGeom>
+          <a:noFill/>
+        </p:spPr>
+        <p:txBody>
+          <a:bodyPr wrap="none" rtlCol="0">
+            <a:spAutoFit/>
+          </a:bodyPr>
+          <a:lstStyle/>
+          <a:p>
+            <a:r>
+              <a:rPr lang="fr-CH" dirty="0"/>
+              <a:t>trigger (</a:t>
+            </a:r>
+            <a:r>
+              <a:rPr lang="fr-CH" dirty="0" err="1"/>
+              <a:t>before</a:t>
+            </a:r>
+            <a:r>
+              <a:rPr lang="fr-CH" dirty="0"/>
+              <a:t> </a:t>
+            </a:r>
+            <a:r>
+              <a:rPr lang="fr-CH" dirty="0" err="1"/>
+              <a:t>delete</a:t>
+            </a:r>
+            <a:r>
+              <a:rPr lang="fr-CH" dirty="0"/>
+              <a:t>)</a:t>
+            </a:r>
+          </a:p>
+        </p:txBody>
+      </p:sp>
+      <p:cxnSp>
+        <p:nvCxnSpPr>
+          <p:cNvPr id="8" name="Connecteur droit avec flèche 7">
+            <a:extLst>
+              <a:ext uri="{FF2B5EF4-FFF2-40B4-BE49-F238E27FC236}">
+                <a16:creationId xmlns:a16="http://schemas.microsoft.com/office/drawing/2014/main" id="{7A0A2296-BF42-4872-9EE0-F5FDB22D56A0}"/>
+              </a:ext>
+            </a:extLst>
+          </p:cNvPr>
+          <p:cNvCxnSpPr/>
+          <p:nvPr/>
+        </p:nvCxnSpPr>
+        <p:spPr>
+          <a:xfrm flipH="1">
+            <a:off x="6935821" y="2937753"/>
+            <a:ext cx="856034" cy="0"/>
+          </a:xfrm>
+          <a:prstGeom prst="straightConnector1">
+            <a:avLst/>
+          </a:prstGeom>
+          <a:ln>
+            <a:tailEnd type="triangle"/>
+          </a:ln>
+        </p:spPr>
+        <p:style>
+          <a:lnRef idx="3">
+            <a:schemeClr val="dk1"/>
+          </a:lnRef>
+          <a:fillRef idx="0">
+            <a:schemeClr val="dk1"/>
+          </a:fillRef>
+          <a:effectRef idx="2">
+            <a:schemeClr val="dk1"/>
+          </a:effectRef>
+          <a:fontRef idx="minor">
+            <a:schemeClr val="tx1"/>
+          </a:fontRef>
+        </p:style>
+      </p:cxnSp>
+      <p:sp>
+        <p:nvSpPr>
+          <p:cNvPr id="9" name="ZoneTexte 8">
+            <a:extLst>
+              <a:ext uri="{FF2B5EF4-FFF2-40B4-BE49-F238E27FC236}">
+                <a16:creationId xmlns:a16="http://schemas.microsoft.com/office/drawing/2014/main" id="{DB4562B4-99A3-4C7E-A504-5AC49BF070D9}"/>
+              </a:ext>
+            </a:extLst>
+          </p:cNvPr>
+          <p:cNvSpPr txBox="1"/>
+          <p:nvPr/>
+        </p:nvSpPr>
+        <p:spPr>
+          <a:xfrm>
+            <a:off x="9006491" y="3580274"/>
+            <a:ext cx="1789977" cy="369332"/>
+          </a:xfrm>
+          <a:prstGeom prst="rect">
+            <a:avLst/>
+          </a:prstGeom>
+          <a:noFill/>
+        </p:spPr>
+        <p:txBody>
+          <a:bodyPr wrap="none" rtlCol="0">
+            <a:spAutoFit/>
+          </a:bodyPr>
+          <a:lstStyle/>
+          <a:p>
+            <a:r>
+              <a:rPr lang="fr-CH" dirty="0" err="1"/>
+              <a:t>event</a:t>
+            </a:r>
+            <a:r>
+              <a:rPr lang="fr-CH" dirty="0"/>
+              <a:t> (</a:t>
+            </a:r>
+            <a:r>
+              <a:rPr lang="fr-CH" dirty="0" err="1"/>
+              <a:t>every</a:t>
+            </a:r>
+            <a:r>
+              <a:rPr lang="fr-CH" dirty="0"/>
+              <a:t> </a:t>
+            </a:r>
+            <a:r>
+              <a:rPr lang="fr-CH" dirty="0" err="1"/>
+              <a:t>day</a:t>
+            </a:r>
+            <a:r>
+              <a:rPr lang="fr-CH" dirty="0"/>
+              <a:t>)</a:t>
+            </a:r>
+          </a:p>
+        </p:txBody>
+      </p:sp>
+      <p:cxnSp>
+        <p:nvCxnSpPr>
+          <p:cNvPr id="10" name="Connecteur droit avec flèche 9">
+            <a:extLst>
+              <a:ext uri="{FF2B5EF4-FFF2-40B4-BE49-F238E27FC236}">
+                <a16:creationId xmlns:a16="http://schemas.microsoft.com/office/drawing/2014/main" id="{86F9343D-6F5D-48FB-B277-9E7A3F65ACB9}"/>
+              </a:ext>
+            </a:extLst>
+          </p:cNvPr>
+          <p:cNvCxnSpPr>
+            <a:cxnSpLocks/>
+          </p:cNvCxnSpPr>
+          <p:nvPr/>
+        </p:nvCxnSpPr>
+        <p:spPr>
+          <a:xfrm flipH="1">
+            <a:off x="9418182" y="3974456"/>
+            <a:ext cx="376449" cy="564901"/>
+          </a:xfrm>
+          <a:prstGeom prst="straightConnector1">
+            <a:avLst/>
+          </a:prstGeom>
+          <a:ln>
+            <a:tailEnd type="triangle"/>
+          </a:ln>
+        </p:spPr>
+        <p:style>
+          <a:lnRef idx="3">
+            <a:schemeClr val="dk1"/>
+          </a:lnRef>
+          <a:fillRef idx="0">
+            <a:schemeClr val="dk1"/>
+          </a:fillRef>
+          <a:effectRef idx="2">
+            <a:schemeClr val="dk1"/>
+          </a:effectRef>
+          <a:fontRef idx="minor">
+            <a:schemeClr val="tx1"/>
+          </a:fontRef>
+        </p:style>
+      </p:cxnSp>
+      <p:sp>
+        <p:nvSpPr>
+          <p:cNvPr id="12" name="ZoneTexte 11">
+            <a:extLst>
+              <a:ext uri="{FF2B5EF4-FFF2-40B4-BE49-F238E27FC236}">
+                <a16:creationId xmlns:a16="http://schemas.microsoft.com/office/drawing/2014/main" id="{53B8C4BB-427E-48D4-AA04-EC8087B54DF4}"/>
+              </a:ext>
+            </a:extLst>
+          </p:cNvPr>
+          <p:cNvSpPr txBox="1"/>
+          <p:nvPr/>
+        </p:nvSpPr>
+        <p:spPr>
+          <a:xfrm>
+            <a:off x="581192" y="5277221"/>
+            <a:ext cx="1789977" cy="369332"/>
+          </a:xfrm>
+          <a:prstGeom prst="rect">
+            <a:avLst/>
+          </a:prstGeom>
+          <a:noFill/>
+        </p:spPr>
+        <p:txBody>
+          <a:bodyPr wrap="none" rtlCol="0">
+            <a:spAutoFit/>
+          </a:bodyPr>
+          <a:lstStyle/>
+          <a:p>
+            <a:r>
+              <a:rPr lang="fr-CH" dirty="0" err="1"/>
+              <a:t>event</a:t>
+            </a:r>
+            <a:r>
+              <a:rPr lang="fr-CH" dirty="0"/>
+              <a:t> (</a:t>
+            </a:r>
+            <a:r>
+              <a:rPr lang="fr-CH" dirty="0" err="1"/>
+              <a:t>every</a:t>
+            </a:r>
+            <a:r>
+              <a:rPr lang="fr-CH" dirty="0"/>
+              <a:t> </a:t>
+            </a:r>
+            <a:r>
+              <a:rPr lang="fr-CH" dirty="0" err="1"/>
+              <a:t>day</a:t>
+            </a:r>
+            <a:r>
+              <a:rPr lang="fr-CH" dirty="0"/>
+              <a:t>)</a:t>
+            </a:r>
+          </a:p>
+        </p:txBody>
+      </p:sp>
+      <p:cxnSp>
+        <p:nvCxnSpPr>
+          <p:cNvPr id="13" name="Connecteur droit avec flèche 12">
+            <a:extLst>
+              <a:ext uri="{FF2B5EF4-FFF2-40B4-BE49-F238E27FC236}">
+                <a16:creationId xmlns:a16="http://schemas.microsoft.com/office/drawing/2014/main" id="{9B0532C1-A0B1-4A3A-BDAE-EA7F66576B44}"/>
+              </a:ext>
+            </a:extLst>
+          </p:cNvPr>
+          <p:cNvCxnSpPr>
+            <a:cxnSpLocks/>
+          </p:cNvCxnSpPr>
+          <p:nvPr/>
+        </p:nvCxnSpPr>
+        <p:spPr>
+          <a:xfrm>
+            <a:off x="2371169" y="5461887"/>
+            <a:ext cx="961115" cy="0"/>
+          </a:xfrm>
+          <a:prstGeom prst="straightConnector1">
+            <a:avLst/>
+          </a:prstGeom>
+          <a:ln>
+            <a:tailEnd type="triangle"/>
+          </a:ln>
+        </p:spPr>
+        <p:style>
+          <a:lnRef idx="3">
+            <a:schemeClr val="dk1"/>
+          </a:lnRef>
+          <a:fillRef idx="0">
+            <a:schemeClr val="dk1"/>
+          </a:fillRef>
+          <a:effectRef idx="2">
+            <a:schemeClr val="dk1"/>
+          </a:effectRef>
+          <a:fontRef idx="minor">
+            <a:schemeClr val="tx1"/>
+          </a:fontRef>
+        </p:style>
+      </p:cxnSp>
     </p:spTree>
     <p:extLst>
       <p:ext uri="{BB962C8B-B14F-4D97-AF65-F5344CB8AC3E}">
-        <p14:creationId xmlns:p14="http://schemas.microsoft.com/office/powerpoint/2010/main" val="1257575831"/>
+        <p14:creationId xmlns:p14="http://schemas.microsoft.com/office/powerpoint/2010/main" val="2168988302"/>
       </p:ext>
     </p:extLst>
   </p:cSld>
@@ -4765,7 +5111,7 @@
           <a:p>
             <a:r>
               <a:rPr lang="fr-CH" dirty="0"/>
-              <a:t>DB</a:t>
+              <a:t>DAL</a:t>
             </a:r>
           </a:p>
         </p:txBody>
@@ -4798,7 +5144,7 @@
     </p:spTree>
     <p:extLst>
       <p:ext uri="{BB962C8B-B14F-4D97-AF65-F5344CB8AC3E}">
-        <p14:creationId xmlns:p14="http://schemas.microsoft.com/office/powerpoint/2010/main" val="2168988302"/>
+        <p14:creationId xmlns:p14="http://schemas.microsoft.com/office/powerpoint/2010/main" val="1257575831"/>
       </p:ext>
     </p:extLst>
   </p:cSld>

</xml_diff>